<commit_message>
Documentation format and enhanced side image.
</commit_message>
<xml_diff>
--- a/release/gff/gff_ethiopic/extras/gff_ethiopic-sideimage.pptx
+++ b/release/gff/gff_ethiopic/extras/gff_ethiopic-sideimage.pptx
@@ -104,6 +104,11 @@
       </a:defRPr>
     </a:lvl9pPr>
   </p:defaultTextStyle>
+  <p:extLst>
+    <p:ext uri="{EFAFB233-063F-42B5-8137-9DF3F51BA10A}">
+      <p15:sldGuideLst xmlns:p15="http://schemas.microsoft.com/office/powerpoint/2012/main"/>
+    </p:ext>
+  </p:extLst>
 </p:presentation>
 </file>
 
@@ -254,7 +259,7 @@
           <a:p>
             <a:fld id="{11F031DC-2F2D-465F-8FCE-9B14A2E2024D}" type="datetimeFigureOut">
               <a:rPr lang="en-US" smtClean="0"/>
-              <a:t>6/18/2023</a:t>
+              <a:t>7/4/2023</a:t>
             </a:fld>
             <a:endParaRPr lang="en-US"/>
           </a:p>
@@ -452,7 +457,7 @@
           <a:p>
             <a:fld id="{11F031DC-2F2D-465F-8FCE-9B14A2E2024D}" type="datetimeFigureOut">
               <a:rPr lang="en-US" smtClean="0"/>
-              <a:t>6/18/2023</a:t>
+              <a:t>7/4/2023</a:t>
             </a:fld>
             <a:endParaRPr lang="en-US"/>
           </a:p>
@@ -660,7 +665,7 @@
           <a:p>
             <a:fld id="{11F031DC-2F2D-465F-8FCE-9B14A2E2024D}" type="datetimeFigureOut">
               <a:rPr lang="en-US" smtClean="0"/>
-              <a:t>6/18/2023</a:t>
+              <a:t>7/4/2023</a:t>
             </a:fld>
             <a:endParaRPr lang="en-US"/>
           </a:p>
@@ -858,7 +863,7 @@
           <a:p>
             <a:fld id="{11F031DC-2F2D-465F-8FCE-9B14A2E2024D}" type="datetimeFigureOut">
               <a:rPr lang="en-US" smtClean="0"/>
-              <a:t>6/18/2023</a:t>
+              <a:t>7/4/2023</a:t>
             </a:fld>
             <a:endParaRPr lang="en-US"/>
           </a:p>
@@ -1133,7 +1138,7 @@
           <a:p>
             <a:fld id="{11F031DC-2F2D-465F-8FCE-9B14A2E2024D}" type="datetimeFigureOut">
               <a:rPr lang="en-US" smtClean="0"/>
-              <a:t>6/18/2023</a:t>
+              <a:t>7/4/2023</a:t>
             </a:fld>
             <a:endParaRPr lang="en-US"/>
           </a:p>
@@ -1398,7 +1403,7 @@
           <a:p>
             <a:fld id="{11F031DC-2F2D-465F-8FCE-9B14A2E2024D}" type="datetimeFigureOut">
               <a:rPr lang="en-US" smtClean="0"/>
-              <a:t>6/18/2023</a:t>
+              <a:t>7/4/2023</a:t>
             </a:fld>
             <a:endParaRPr lang="en-US"/>
           </a:p>
@@ -1810,7 +1815,7 @@
           <a:p>
             <a:fld id="{11F031DC-2F2D-465F-8FCE-9B14A2E2024D}" type="datetimeFigureOut">
               <a:rPr lang="en-US" smtClean="0"/>
-              <a:t>6/18/2023</a:t>
+              <a:t>7/4/2023</a:t>
             </a:fld>
             <a:endParaRPr lang="en-US"/>
           </a:p>
@@ -1951,7 +1956,7 @@
           <a:p>
             <a:fld id="{11F031DC-2F2D-465F-8FCE-9B14A2E2024D}" type="datetimeFigureOut">
               <a:rPr lang="en-US" smtClean="0"/>
-              <a:t>6/18/2023</a:t>
+              <a:t>7/4/2023</a:t>
             </a:fld>
             <a:endParaRPr lang="en-US"/>
           </a:p>
@@ -2064,7 +2069,7 @@
           <a:p>
             <a:fld id="{11F031DC-2F2D-465F-8FCE-9B14A2E2024D}" type="datetimeFigureOut">
               <a:rPr lang="en-US" smtClean="0"/>
-              <a:t>6/18/2023</a:t>
+              <a:t>7/4/2023</a:t>
             </a:fld>
             <a:endParaRPr lang="en-US"/>
           </a:p>
@@ -2375,7 +2380,7 @@
           <a:p>
             <a:fld id="{11F031DC-2F2D-465F-8FCE-9B14A2E2024D}" type="datetimeFigureOut">
               <a:rPr lang="en-US" smtClean="0"/>
-              <a:t>6/18/2023</a:t>
+              <a:t>7/4/2023</a:t>
             </a:fld>
             <a:endParaRPr lang="en-US"/>
           </a:p>
@@ -2663,7 +2668,7 @@
           <a:p>
             <a:fld id="{11F031DC-2F2D-465F-8FCE-9B14A2E2024D}" type="datetimeFigureOut">
               <a:rPr lang="en-US" smtClean="0"/>
-              <a:t>6/18/2023</a:t>
+              <a:t>7/4/2023</a:t>
             </a:fld>
             <a:endParaRPr lang="en-US"/>
           </a:p>
@@ -2904,7 +2909,7 @@
           <a:p>
             <a:fld id="{11F031DC-2F2D-465F-8FCE-9B14A2E2024D}" type="datetimeFigureOut">
               <a:rPr lang="en-US" smtClean="0"/>
-              <a:t>6/18/2023</a:t>
+              <a:t>7/4/2023</a:t>
             </a:fld>
             <a:endParaRPr lang="en-US"/>
           </a:p>
@@ -3523,7 +3528,7 @@
         </p:nvSpPr>
         <p:spPr>
           <a:xfrm rot="21246558">
-            <a:off x="4552349" y="1815663"/>
+            <a:off x="4675477" y="1815566"/>
             <a:ext cx="555572" cy="553998"/>
           </a:xfrm>
           <a:prstGeom prst="rect">
@@ -3751,7 +3756,7 @@
         </p:nvSpPr>
         <p:spPr>
           <a:xfrm>
-            <a:off x="4656371" y="2979176"/>
+            <a:off x="4656371" y="2861730"/>
             <a:ext cx="366995" cy="553998"/>
           </a:xfrm>
           <a:prstGeom prst="rect">
@@ -4658,6 +4663,156 @@
                 <a:schemeClr val="accent4"/>
               </a:solidFill>
               <a:effectLst/>
+              <a:latin typeface="Abyssinica SIL" panose="02000000000000000000" pitchFamily="2" charset="0"/>
+              <a:ea typeface="Abyssinica SIL" panose="02000000000000000000" pitchFamily="2" charset="0"/>
+              <a:cs typeface="Abyssinica SIL" panose="02000000000000000000" pitchFamily="2" charset="0"/>
+            </a:endParaRPr>
+          </a:p>
+        </p:txBody>
+      </p:sp>
+      <p:sp>
+        <p:nvSpPr>
+          <p:cNvPr id="2" name="TextBox 1">
+            <a:extLst>
+              <a:ext uri="{FF2B5EF4-FFF2-40B4-BE49-F238E27FC236}">
+                <a16:creationId xmlns:a16="http://schemas.microsoft.com/office/drawing/2014/main" id="{511C30E1-C3FD-A5BC-5B77-8970C1320F13}"/>
+              </a:ext>
+            </a:extLst>
+          </p:cNvPr>
+          <p:cNvSpPr txBox="1"/>
+          <p:nvPr/>
+        </p:nvSpPr>
+        <p:spPr>
+          <a:xfrm rot="1327899">
+            <a:off x="4090414" y="1834385"/>
+            <a:ext cx="555572" cy="553998"/>
+          </a:xfrm>
+          <a:prstGeom prst="rect">
+            <a:avLst/>
+          </a:prstGeom>
+          <a:noFill/>
+        </p:spPr>
+        <p:txBody>
+          <a:bodyPr wrap="square" lIns="0" tIns="0" rIns="0" bIns="0" rtlCol="0">
+            <a:spAutoFit/>
+          </a:bodyPr>
+          <a:lstStyle/>
+          <a:p>
+            <a:r>
+              <a:rPr lang="en-US" sz="3600" dirty="0">
+                <a:solidFill>
+                  <a:srgbClr val="FF9966"/>
+                </a:solidFill>
+                <a:effectLst/>
+                <a:latin typeface="Abyssinica SIL Alternate 2" panose="02000000000000000000" pitchFamily="2" charset="0"/>
+                <a:ea typeface="Times New Roman" panose="02020603050405020304" pitchFamily="18" charset="0"/>
+              </a:rPr>
+              <a:t>ዣ</a:t>
+            </a:r>
+            <a:endParaRPr lang="en-US" sz="3600" dirty="0">
+              <a:solidFill>
+                <a:srgbClr val="FF9966"/>
+              </a:solidFill>
+              <a:latin typeface="Abyssinica SIL" panose="02000000000000000000" pitchFamily="2" charset="0"/>
+              <a:ea typeface="Abyssinica SIL" panose="02000000000000000000" pitchFamily="2" charset="0"/>
+              <a:cs typeface="Abyssinica SIL" panose="02000000000000000000" pitchFamily="2" charset="0"/>
+            </a:endParaRPr>
+          </a:p>
+        </p:txBody>
+      </p:sp>
+      <p:sp>
+        <p:nvSpPr>
+          <p:cNvPr id="3" name="TextBox 2">
+            <a:extLst>
+              <a:ext uri="{FF2B5EF4-FFF2-40B4-BE49-F238E27FC236}">
+                <a16:creationId xmlns:a16="http://schemas.microsoft.com/office/drawing/2014/main" id="{774C5406-91D4-FB8A-0001-3093E81C5F6F}"/>
+              </a:ext>
+            </a:extLst>
+          </p:cNvPr>
+          <p:cNvSpPr txBox="1"/>
+          <p:nvPr/>
+        </p:nvSpPr>
+        <p:spPr>
+          <a:xfrm rot="21246558">
+            <a:off x="5982706" y="2044219"/>
+            <a:ext cx="555572" cy="553998"/>
+          </a:xfrm>
+          <a:prstGeom prst="rect">
+            <a:avLst/>
+          </a:prstGeom>
+          <a:noFill/>
+        </p:spPr>
+        <p:txBody>
+          <a:bodyPr wrap="square" lIns="0" tIns="0" rIns="0" bIns="0" rtlCol="0">
+            <a:spAutoFit/>
+          </a:bodyPr>
+          <a:lstStyle/>
+          <a:p>
+            <a:r>
+              <a:rPr lang="en-US" sz="3600" dirty="0">
+                <a:solidFill>
+                  <a:srgbClr val="00B0F0"/>
+                </a:solidFill>
+                <a:effectLst/>
+                <a:latin typeface="Abyssinica SIL Alternate 1" panose="02000000000000000000" pitchFamily="2" charset="0"/>
+                <a:ea typeface="Times New Roman" panose="02020603050405020304" pitchFamily="18" charset="0"/>
+              </a:rPr>
+              <a:t>ጿ</a:t>
+            </a:r>
+            <a:endParaRPr lang="en-US" sz="3600" dirty="0">
+              <a:solidFill>
+                <a:srgbClr val="00B0F0"/>
+              </a:solidFill>
+              <a:latin typeface="Abyssinica SIL" panose="02000000000000000000" pitchFamily="2" charset="0"/>
+              <a:ea typeface="Abyssinica SIL" panose="02000000000000000000" pitchFamily="2" charset="0"/>
+              <a:cs typeface="Abyssinica SIL" panose="02000000000000000000" pitchFamily="2" charset="0"/>
+            </a:endParaRPr>
+          </a:p>
+        </p:txBody>
+      </p:sp>
+      <p:sp>
+        <p:nvSpPr>
+          <p:cNvPr id="6" name="TextBox 5">
+            <a:extLst>
+              <a:ext uri="{FF2B5EF4-FFF2-40B4-BE49-F238E27FC236}">
+                <a16:creationId xmlns:a16="http://schemas.microsoft.com/office/drawing/2014/main" id="{AFD8EC94-619F-363C-B9CC-3C22548D8DCB}"/>
+              </a:ext>
+            </a:extLst>
+          </p:cNvPr>
+          <p:cNvSpPr txBox="1"/>
+          <p:nvPr/>
+        </p:nvSpPr>
+        <p:spPr>
+          <a:xfrm rot="21246558">
+            <a:off x="6066797" y="4049957"/>
+            <a:ext cx="555572" cy="553998"/>
+          </a:xfrm>
+          <a:prstGeom prst="rect">
+            <a:avLst/>
+          </a:prstGeom>
+          <a:noFill/>
+        </p:spPr>
+        <p:txBody>
+          <a:bodyPr wrap="square" lIns="0" tIns="0" rIns="0" bIns="0" rtlCol="0">
+            <a:spAutoFit/>
+          </a:bodyPr>
+          <a:lstStyle/>
+          <a:p>
+            <a:r>
+              <a:rPr lang="en-US" sz="3600" dirty="0">
+                <a:solidFill>
+                  <a:srgbClr val="FF0000"/>
+                </a:solidFill>
+                <a:effectLst/>
+                <a:latin typeface="Abyssinica SIL Alternate 1" panose="02000000000000000000" pitchFamily="2" charset="0"/>
+                <a:ea typeface="Times New Roman" panose="02020603050405020304" pitchFamily="18" charset="0"/>
+              </a:rPr>
+              <a:t>ጵ</a:t>
+            </a:r>
+            <a:endParaRPr lang="en-US" sz="3600" dirty="0">
+              <a:solidFill>
+                <a:srgbClr val="FF0000"/>
+              </a:solidFill>
               <a:latin typeface="Abyssinica SIL" panose="02000000000000000000" pitchFamily="2" charset="0"/>
               <a:ea typeface="Abyssinica SIL" panose="02000000000000000000" pitchFamily="2" charset="0"/>
               <a:cs typeface="Abyssinica SIL" panose="02000000000000000000" pitchFamily="2" charset="0"/>

</xml_diff>